<commit_message>
update text of thesis
</commit_message>
<xml_diff>
--- a/Documentation/Prezenacia_progessu.pptx
+++ b/Documentation/Prezenacia_progessu.pptx
@@ -14,6 +14,8 @@
     <p:sldId id="261" r:id="rId9"/>
     <p:sldId id="262" r:id="rId10"/>
     <p:sldId id="263" r:id="rId11"/>
+    <p:sldId id="264" r:id="rId12"/>
+    <p:sldId id="265" r:id="rId13"/>
   </p:sldIdLst>
   <p:sldSz cx="10080625" cy="5670550"/>
   <p:notesSz cx="7559675" cy="10691813"/>
@@ -723,7 +725,7 @@
         <p:txBody>
           <a:bodyPr/>
           <a:p>
-            <a:fld id="{CE7579B4-0501-4870-901F-9472AB88ED90}" type="slidenum">
+            <a:fld id="{0B2D53E0-208D-4CDE-8B1A-E555A7EDF36B}" type="slidenum">
               <a:t>&lt;#&gt;</a:t>
             </a:fld>
           </a:p>
@@ -886,7 +888,7 @@
         <p:txBody>
           <a:bodyPr/>
           <a:p>
-            <a:fld id="{F7F3C87F-24A6-498F-B89C-E6E176E010FB}" type="slidenum">
+            <a:fld id="{529DA933-B22B-4E00-A94A-873B53C9BE85}" type="slidenum">
               <a:t>&lt;#&gt;</a:t>
             </a:fld>
           </a:p>
@@ -1046,7 +1048,7 @@
         <p:txBody>
           <a:bodyPr/>
           <a:p>
-            <a:fld id="{7F0AFFDC-12C6-48B0-9F27-1B2E31D1B8C0}" type="slidenum">
+            <a:fld id="{02BB5F97-4B1F-4A30-BF80-22B46089BFBC}" type="slidenum">
               <a:t>&lt;#&gt;</a:t>
             </a:fld>
           </a:p>
@@ -1243,7 +1245,7 @@
         <p:txBody>
           <a:bodyPr/>
           <a:p>
-            <a:fld id="{F2A7D0F1-DC09-4FBD-A1E4-EADA7D150520}" type="slidenum">
+            <a:fld id="{B8B7DA7B-40C0-4E29-9E8E-CD7CC75630E5}" type="slidenum">
               <a:t>&lt;#&gt;</a:t>
             </a:fld>
           </a:p>
@@ -1366,7 +1368,7 @@
         <p:txBody>
           <a:bodyPr/>
           <a:p>
-            <a:fld id="{D8B1D5A1-374D-4231-8373-EC76186FF70B}" type="slidenum">
+            <a:fld id="{F11B2B6C-A2AD-4791-AFFE-453227877316}" type="slidenum">
               <a:t>&lt;#&gt;</a:t>
             </a:fld>
           </a:p>
@@ -1489,7 +1491,7 @@
         <p:txBody>
           <a:bodyPr/>
           <a:p>
-            <a:fld id="{D8B0F892-80E1-4F1B-9DC4-C218CC725E97}" type="slidenum">
+            <a:fld id="{A0915312-9C4C-43AF-AB7A-30420D51D20F}" type="slidenum">
               <a:t>&lt;#&gt;</a:t>
             </a:fld>
           </a:p>
@@ -1723,7 +1725,7 @@
         <p:txBody>
           <a:bodyPr/>
           <a:p>
-            <a:fld id="{77DA8A57-6CA3-4455-A96A-D7B0ADB0C2A7}" type="slidenum">
+            <a:fld id="{56B500C7-E1CB-481E-B38B-FFA890017373}" type="slidenum">
               <a:t>&lt;#&gt;</a:t>
             </a:fld>
           </a:p>
@@ -2059,7 +2061,7 @@
         <p:txBody>
           <a:bodyPr/>
           <a:p>
-            <a:fld id="{1DE47C73-0309-4FD8-BCF8-7F45C0F35031}" type="slidenum">
+            <a:fld id="{9B39F299-E3C5-4B14-829C-402FA96D5995}" type="slidenum">
               <a:t>&lt;#&gt;</a:t>
             </a:fld>
           </a:p>
@@ -2293,7 +2295,7 @@
         <p:txBody>
           <a:bodyPr/>
           <a:p>
-            <a:fld id="{675E9363-D948-42F5-8CCD-430CD60393E7}" type="slidenum">
+            <a:fld id="{E562D8C9-401F-49DF-821C-5B70A0630331}" type="slidenum">
               <a:t>&lt;#&gt;</a:t>
             </a:fld>
           </a:p>
@@ -2490,7 +2492,7 @@
         <p:txBody>
           <a:bodyPr/>
           <a:p>
-            <a:fld id="{56C2821E-CEB6-43DB-A7F7-3526182BA26D}" type="slidenum">
+            <a:fld id="{6E291276-07C4-49BD-8425-F93D1770532A}" type="slidenum">
               <a:t>&lt;#&gt;</a:t>
             </a:fld>
           </a:p>
@@ -2761,7 +2763,7 @@
         <p:txBody>
           <a:bodyPr/>
           <a:p>
-            <a:fld id="{EBB1C5BB-3D3D-449D-8263-77B580DD7F47}" type="slidenum">
+            <a:fld id="{DFB6CF63-DDC7-4C3D-AB4C-93F31F99CEBC}" type="slidenum">
               <a:t>&lt;#&gt;</a:t>
             </a:fld>
           </a:p>
@@ -3106,7 +3108,7 @@
         <p:txBody>
           <a:bodyPr/>
           <a:p>
-            <a:fld id="{1F0A5AF1-3BF8-491E-ACD4-D2DE0D4E94E0}" type="slidenum">
+            <a:fld id="{33D446A1-31B1-4166-9147-781AE6493753}" type="slidenum">
               <a:t>&lt;#&gt;</a:t>
             </a:fld>
           </a:p>
@@ -4462,7 +4464,7 @@
             <a:pPr algn="r">
               <a:buNone/>
             </a:pPr>
-            <a:fld id="{780BC86A-6256-4F22-A3A5-569165A34769}" type="slidenum">
+            <a:fld id="{F70CFBB6-07F9-4C66-BB8C-D396ABBB6694}" type="slidenum">
               <a:rPr b="0" lang="en-US" sz="1400" spc="-1" strike="noStrike">
                 <a:solidFill>
                   <a:srgbClr val="ffffff"/>
@@ -5031,7 +5033,7 @@
             <a:pPr algn="r">
               <a:buNone/>
             </a:pPr>
-            <a:fld id="{85A48EC1-C9C1-4F82-8D58-0A5B83198D9C}" type="slidenum">
+            <a:fld id="{B2C28259-5910-4499-A40C-678597431694}" type="slidenum">
               <a:rPr b="0" lang="en-US" sz="1400" spc="-1" strike="noStrike">
                 <a:solidFill>
                   <a:srgbClr val="ffffff"/>
@@ -5160,6 +5162,149 @@
 </p:sld>
 </file>
 
+<file path=ppt/slides/slide10.xml><?xml version="1.0" encoding="utf-8"?>
+<p:sld xmlns:a="http://schemas.openxmlformats.org/drawingml/2006/main" xmlns:p="http://schemas.openxmlformats.org/presentationml/2006/main" xmlns:r="http://schemas.openxmlformats.org/officeDocument/2006/relationships" xmlns:p14="http://schemas.microsoft.com/office/powerpoint/2010/main" xmlns:p15="http://schemas.microsoft.com/office/powerpoint/2012/main" xmlns:mc="http://schemas.openxmlformats.org/markup-compatibility/2006">
+  <p:cSld>
+    <p:spTree>
+      <p:nvGrpSpPr>
+        <p:cNvPr id="1" name=""/>
+        <p:cNvGrpSpPr/>
+        <p:nvPr/>
+      </p:nvGrpSpPr>
+      <p:grpSpPr>
+        <a:xfrm>
+          <a:off x="0" y="0"/>
+          <a:ext cx="0" cy="0"/>
+          <a:chOff x="0" y="0"/>
+          <a:chExt cx="0" cy="0"/>
+        </a:xfrm>
+      </p:grpSpPr>
+      <p:sp>
+        <p:nvSpPr>
+          <p:cNvPr id="114" name="PlaceHolder 1"/>
+          <p:cNvSpPr>
+            <a:spLocks noGrp="1"/>
+          </p:cNvSpPr>
+          <p:nvPr>
+            <p:ph type="title"/>
+          </p:nvPr>
+        </p:nvSpPr>
+        <p:spPr>
+          <a:xfrm>
+            <a:off x="360000" y="180000"/>
+            <a:ext cx="9360000" cy="478080"/>
+          </a:xfrm>
+          <a:prstGeom prst="rect">
+            <a:avLst/>
+          </a:prstGeom>
+          <a:noFill/>
+          <a:ln w="0">
+            <a:noFill/>
+          </a:ln>
+        </p:spPr>
+        <p:txBody>
+          <a:bodyPr lIns="0" rIns="0" tIns="0" bIns="0" anchor="ctr">
+            <a:noAutofit/>
+          </a:bodyPr>
+          <a:p>
+            <a:pPr algn="ctr">
+              <a:buNone/>
+            </a:pPr>
+            <a:r>
+              <a:rPr b="0" lang="en-US" sz="3300" spc="-1" strike="noStrike">
+                <a:solidFill>
+                  <a:srgbClr val="ffffff"/>
+                </a:solidFill>
+                <a:latin typeface="Arial"/>
+              </a:rPr>
+              <a:t>Ukážka spustenia natrénovaného modelu</a:t>
+            </a:r>
+            <a:endParaRPr b="0" lang="en-US" sz="3300" spc="-1" strike="noStrike">
+              <a:solidFill>
+                <a:srgbClr val="ffffff"/>
+              </a:solidFill>
+              <a:latin typeface="Arial"/>
+            </a:endParaRPr>
+          </a:p>
+        </p:txBody>
+      </p:sp>
+      <p:pic>
+        <p:nvPicPr>
+          <p:cNvPr id="115" name="" descr=""/>
+          <p:cNvPicPr/>
+          <p:nvPr/>
+        </p:nvPicPr>
+        <p:blipFill>
+          <a:blip r:embed="rId1"/>
+          <a:stretch/>
+        </p:blipFill>
+        <p:spPr>
+          <a:xfrm>
+            <a:off x="2633400" y="1080000"/>
+            <a:ext cx="4813200" cy="3600000"/>
+          </a:xfrm>
+          <a:prstGeom prst="rect">
+            <a:avLst/>
+          </a:prstGeom>
+          <a:ln w="18000">
+            <a:noFill/>
+          </a:ln>
+        </p:spPr>
+      </p:pic>
+      <p:sp>
+        <p:nvSpPr>
+          <p:cNvPr id="3" name="PlaceHolder 2"/>
+          <p:cNvSpPr>
+            <a:spLocks noGrp="1"/>
+          </p:cNvSpPr>
+          <p:nvPr>
+            <p:ph type="sldNum" idx="3"/>
+          </p:nvPr>
+        </p:nvSpPr>
+        <p:spPr/>
+        <p:txBody>
+          <a:bodyPr/>
+          <a:p>
+            <a:fld id="{DE23213E-1F95-4D21-AB1F-EED96EA0EDE8}" type="slidenum">
+              <a:t>10</a:t>
+            </a:fld>
+          </a:p>
+        </p:txBody>
+      </p:sp>
+      <p:sp>
+        <p:nvSpPr>
+          <p:cNvPr id="4" name="PlaceHolder 3"/>
+          <p:cNvSpPr>
+            <a:spLocks noGrp="1"/>
+          </p:cNvSpPr>
+          <p:nvPr>
+            <p:ph type="dt" idx="1"/>
+          </p:nvPr>
+        </p:nvSpPr>
+        <p:spPr/>
+        <p:txBody>
+          <a:bodyPr/>
+          <a:p>
+            <a:fld id="{46E20FAE-B7AC-43EB-BCD0-487B264A6A60}" type="datetime1">
+              <a:rPr lang="en-US"/>
+              <a:t>01/20/2023</a:t>
+            </a:fld>
+          </a:p>
+        </p:txBody>
+      </p:sp>
+    </p:spTree>
+  </p:cSld>
+  <mc:AlternateContent>
+    <mc:Choice Requires="p14">
+      <p:transition spd="slow" p14:dur="2000"/>
+    </mc:Choice>
+    <mc:Fallback>
+      <p:transition spd="slow"/>
+    </mc:Fallback>
+  </mc:AlternateContent>
+</p:sld>
+</file>
+
 <file path=ppt/slides/slide2.xml><?xml version="1.0" encoding="utf-8"?>
 <p:sld xmlns:a="http://schemas.openxmlformats.org/drawingml/2006/main" xmlns:p="http://schemas.openxmlformats.org/presentationml/2006/main" xmlns:r="http://schemas.openxmlformats.org/officeDocument/2006/relationships" xmlns:p14="http://schemas.microsoft.com/office/powerpoint/2010/main" xmlns:p15="http://schemas.microsoft.com/office/powerpoint/2012/main" xmlns:mc="http://schemas.openxmlformats.org/markup-compatibility/2006">
   <p:cSld>
@@ -5263,7 +5408,7 @@
         <p:txBody>
           <a:bodyPr/>
           <a:p>
-            <a:fld id="{2E286A18-2520-42CD-AC08-18F2D5202E2F}" type="slidenum">
+            <a:fld id="{8AE77637-F22E-4D49-BCB9-EBA7FCC20B7F}" type="slidenum">
               <a:t>2</a:t>
             </a:fld>
           </a:p>
@@ -5283,9 +5428,9 @@
         <p:txBody>
           <a:bodyPr/>
           <a:p>
-            <a:fld id="{69DE2BBE-4B4A-4422-B2ED-BAA5AA741613}" type="datetime1">
+            <a:fld id="{4A22C2E2-97D5-479F-915A-AC3CC3963AE7}" type="datetime1">
               <a:rPr lang="en-US"/>
-              <a:t>01/13/2023</a:t>
+              <a:t>01/20/2023</a:t>
             </a:fld>
           </a:p>
         </p:txBody>
@@ -5418,7 +5563,7 @@
         <p:txBody>
           <a:bodyPr/>
           <a:p>
-            <a:fld id="{041A1842-A1DF-4E12-AA85-72BE598B33F3}" type="slidenum">
+            <a:fld id="{386C4611-383C-4F26-A163-50095A61D8B8}" type="slidenum">
               <a:t>3</a:t>
             </a:fld>
           </a:p>
@@ -5438,9 +5583,9 @@
         <p:txBody>
           <a:bodyPr/>
           <a:p>
-            <a:fld id="{8369C21F-E1D7-41D1-ACFD-C3864180EB4F}" type="datetime1">
+            <a:fld id="{D33F8CD4-3E0A-47F3-BC63-5D586905F2BE}" type="datetime1">
               <a:rPr lang="en-US"/>
-              <a:t>01/13/2023</a:t>
+              <a:t>01/20/2023</a:t>
             </a:fld>
           </a:p>
         </p:txBody>
@@ -5536,7 +5681,7 @@
         </p:blipFill>
         <p:spPr>
           <a:xfrm>
-            <a:off x="360000" y="1721160"/>
+            <a:off x="360000" y="914400"/>
             <a:ext cx="9360000" cy="2317680"/>
           </a:xfrm>
           <a:prstGeom prst="rect">
@@ -5549,6 +5694,96 @@
       </p:pic>
       <p:sp>
         <p:nvSpPr>
+          <p:cNvPr id="92" name=""/>
+          <p:cNvSpPr txBox="1"/>
+          <p:nvPr/>
+        </p:nvSpPr>
+        <p:spPr>
+          <a:xfrm>
+            <a:off x="457200" y="3429000"/>
+            <a:ext cx="8458200" cy="602280"/>
+          </a:xfrm>
+          <a:prstGeom prst="rect">
+            <a:avLst/>
+          </a:prstGeom>
+          <a:noFill/>
+          <a:ln w="18000">
+            <a:noFill/>
+          </a:ln>
+        </p:spPr>
+        <p:txBody>
+          <a:bodyPr lIns="90000" rIns="90000" tIns="45000" bIns="45000" anchor="t">
+            <a:noAutofit/>
+          </a:bodyPr>
+          <a:p>
+            <a:r>
+              <a:rPr b="0" lang="en-US" sz="1800" spc="-1" strike="noStrike">
+                <a:latin typeface="Arial"/>
+              </a:rPr>
+              <a:t>Base classes: </a:t>
+            </a:r>
+            <a:r>
+              <a:rPr b="0" lang="en-US" sz="1800" spc="-1" strike="noStrike">
+                <a:latin typeface="Arial"/>
+              </a:rPr>
+              <a:t>aeroplane, bicycle, boat, bottle, car, cat, chair, diningtable, dog, horse, person, pottedplant, sheep, train, tvmonitor </a:t>
+            </a:r>
+            <a:endParaRPr b="0" lang="en-US" sz="1800" spc="-1" strike="noStrike">
+              <a:latin typeface="Arial"/>
+            </a:endParaRPr>
+          </a:p>
+        </p:txBody>
+      </p:sp>
+      <p:sp>
+        <p:nvSpPr>
+          <p:cNvPr id="93" name=""/>
+          <p:cNvSpPr txBox="1"/>
+          <p:nvPr/>
+        </p:nvSpPr>
+        <p:spPr>
+          <a:xfrm>
+            <a:off x="457200" y="4343400"/>
+            <a:ext cx="5548320" cy="346320"/>
+          </a:xfrm>
+          <a:prstGeom prst="rect">
+            <a:avLst/>
+          </a:prstGeom>
+          <a:noFill/>
+          <a:ln w="18000">
+            <a:noFill/>
+          </a:ln>
+        </p:spPr>
+        <p:txBody>
+          <a:bodyPr lIns="90000" rIns="90000" tIns="45000" bIns="45000" anchor="t">
+            <a:noAutofit/>
+          </a:bodyPr>
+          <a:p>
+            <a:r>
+              <a:rPr b="0" lang="en-US" sz="1800" spc="-1" strike="noStrike">
+                <a:latin typeface="Arial"/>
+              </a:rPr>
+              <a:t>Novel classes: </a:t>
+            </a:r>
+            <a:r>
+              <a:rPr b="0" lang="en-US" sz="1800" spc="-1" strike="noStrike">
+                <a:latin typeface="Arial"/>
+              </a:rPr>
+              <a:t>bird, bus, cow, motorbike, sofa, apple</a:t>
+            </a:r>
+            <a:r>
+              <a:rPr b="0" lang="en-US" sz="1800" spc="-1" strike="noStrike">
+                <a:latin typeface="Arial"/>
+              </a:rPr>
+              <a:t> </a:t>
+            </a:r>
+            <a:endParaRPr b="0" lang="en-US" sz="1800" spc="-1" strike="noStrike">
+              <a:latin typeface="Arial"/>
+            </a:endParaRPr>
+          </a:p>
+        </p:txBody>
+      </p:sp>
+      <p:sp>
+        <p:nvSpPr>
           <p:cNvPr id="3" name="PlaceHolder 2"/>
           <p:cNvSpPr>
             <a:spLocks noGrp="1"/>
@@ -5561,7 +5796,7 @@
         <p:txBody>
           <a:bodyPr/>
           <a:p>
-            <a:fld id="{4EC4A3B5-AE49-4476-A161-E5EAEBD6B4FA}" type="slidenum">
+            <a:fld id="{BA0603F7-E03F-40EC-A879-6F418746DE8D}" type="slidenum">
               <a:t>4</a:t>
             </a:fld>
           </a:p>
@@ -5581,9 +5816,9 @@
         <p:txBody>
           <a:bodyPr/>
           <a:p>
-            <a:fld id="{8B427710-0F25-4807-9ED2-D72B3AE7AB5C}" type="datetime1">
+            <a:fld id="{51FF2EF3-395F-439D-8D00-E21EFE6430AA}" type="datetime1">
               <a:rPr lang="en-US"/>
-              <a:t>01/13/2023</a:t>
+              <a:t>01/20/2023</a:t>
             </a:fld>
           </a:p>
         </p:txBody>
@@ -5620,7 +5855,7 @@
       </p:grpSpPr>
       <p:sp>
         <p:nvSpPr>
-          <p:cNvPr id="92" name="PlaceHolder 1"/>
+          <p:cNvPr id="94" name="PlaceHolder 1"/>
           <p:cNvSpPr>
             <a:spLocks noGrp="1"/>
           </p:cNvSpPr>
@@ -5667,29 +5902,292 @@
           </a:p>
         </p:txBody>
       </p:sp>
-      <p:pic>
-        <p:nvPicPr>
-          <p:cNvPr id="93" name="" descr=""/>
-          <p:cNvPicPr/>
+      <p:graphicFrame>
+        <p:nvGraphicFramePr>
+          <p:cNvPr id="95" name=""/>
+          <p:cNvGraphicFramePr/>
           <p:nvPr/>
-        </p:nvPicPr>
-        <p:blipFill>
-          <a:blip r:embed="rId1"/>
-          <a:stretch/>
-        </p:blipFill>
-        <p:spPr>
-          <a:xfrm>
-            <a:off x="2286000" y="914400"/>
-            <a:ext cx="5268960" cy="4023720"/>
-          </a:xfrm>
-          <a:prstGeom prst="rect">
-            <a:avLst/>
-          </a:prstGeom>
-          <a:ln w="18000">
-            <a:noFill/>
-          </a:ln>
-        </p:spPr>
-      </p:pic>
+        </p:nvGraphicFramePr>
+        <p:xfrm>
+          <a:off x="2375640" y="1578240"/>
+          <a:ext cx="5075280" cy="2159280"/>
+        </p:xfrm>
+        <a:graphic>
+          <a:graphicData uri="http://schemas.openxmlformats.org/drawingml/2006/table">
+            <a:tbl>
+              <a:tblPr/>
+              <a:tblGrid>
+                <a:gridCol w="2537640"/>
+                <a:gridCol w="2538000"/>
+              </a:tblGrid>
+              <a:tr h="719640">
+                <a:tc>
+                  <a:txBody>
+                    <a:bodyPr lIns="90000" rIns="90000" tIns="46800" bIns="46800" anchor="t">
+                      <a:noAutofit/>
+                    </a:bodyPr>
+                    <a:p>
+                      <a:r>
+                        <a:rPr b="0" lang="en-US" sz="1800" spc="-1" strike="noStrike">
+                          <a:latin typeface="Arial"/>
+                        </a:rPr>
+                        <a:t>Learning rate </a:t>
+                      </a:r>
+                      <a:endParaRPr b="0" lang="en-US" sz="1800" spc="-1" strike="noStrike">
+                        <a:latin typeface="Arial"/>
+                      </a:endParaRPr>
+                    </a:p>
+                  </a:txBody>
+                  <a:tcPr anchor="t" marL="90000" marR="90000">
+                    <a:lnL w="720">
+                      <a:solidFill>
+                        <a:srgbClr val="ffffff"/>
+                      </a:solidFill>
+                    </a:lnL>
+                    <a:lnR w="720">
+                      <a:solidFill>
+                        <a:srgbClr val="ffffff"/>
+                      </a:solidFill>
+                    </a:lnR>
+                    <a:lnT w="720">
+                      <a:solidFill>
+                        <a:srgbClr val="ffffff"/>
+                      </a:solidFill>
+                    </a:lnT>
+                    <a:lnB w="720">
+                      <a:solidFill>
+                        <a:srgbClr val="ffffff"/>
+                      </a:solidFill>
+                    </a:lnB>
+                    <a:solidFill>
+                      <a:srgbClr val="b3b3b3"/>
+                    </a:solidFill>
+                  </a:tcPr>
+                </a:tc>
+                <a:tc>
+                  <a:txBody>
+                    <a:bodyPr lIns="90000" rIns="90000" tIns="46800" bIns="46800" anchor="t">
+                      <a:noAutofit/>
+                    </a:bodyPr>
+                    <a:p>
+                      <a:r>
+                        <a:rPr b="0" lang="en-US" sz="1800" spc="-1" strike="noStrike">
+                          <a:latin typeface="Arial"/>
+                        </a:rPr>
+                        <a:t>0.000125</a:t>
+                      </a:r>
+                      <a:endParaRPr b="0" lang="en-US" sz="1800" spc="-1" strike="noStrike">
+                        <a:latin typeface="Arial"/>
+                      </a:endParaRPr>
+                    </a:p>
+                  </a:txBody>
+                  <a:tcPr anchor="t" marL="90000" marR="90000">
+                    <a:lnL w="720">
+                      <a:solidFill>
+                        <a:srgbClr val="ffffff"/>
+                      </a:solidFill>
+                    </a:lnL>
+                    <a:lnR w="720">
+                      <a:solidFill>
+                        <a:srgbClr val="ffffff"/>
+                      </a:solidFill>
+                    </a:lnR>
+                    <a:lnT w="720">
+                      <a:solidFill>
+                        <a:srgbClr val="ffffff"/>
+                      </a:solidFill>
+                    </a:lnT>
+                    <a:lnB w="720">
+                      <a:solidFill>
+                        <a:srgbClr val="ffffff"/>
+                      </a:solidFill>
+                    </a:lnB>
+                    <a:solidFill>
+                      <a:srgbClr val="b3b3b3"/>
+                    </a:solidFill>
+                  </a:tcPr>
+                </a:tc>
+              </a:tr>
+              <a:tr h="719640">
+                <a:tc>
+                  <a:txBody>
+                    <a:bodyPr lIns="90000" rIns="90000" tIns="46800" bIns="46800" anchor="t">
+                      <a:noAutofit/>
+                    </a:bodyPr>
+                    <a:p>
+                      <a:r>
+                        <a:rPr b="0" lang="en-US" sz="1800" spc="-1" strike="noStrike">
+                          <a:latin typeface="Arial"/>
+                        </a:rPr>
+                        <a:t>Batch size </a:t>
+                      </a:r>
+                      <a:endParaRPr b="0" lang="en-US" sz="1800" spc="-1" strike="noStrike">
+                        <a:latin typeface="Arial"/>
+                      </a:endParaRPr>
+                    </a:p>
+                  </a:txBody>
+                  <a:tcPr anchor="t" marL="90000" marR="90000">
+                    <a:lnL w="720">
+                      <a:solidFill>
+                        <a:srgbClr val="ffffff"/>
+                      </a:solidFill>
+                    </a:lnL>
+                    <a:lnR w="720">
+                      <a:solidFill>
+                        <a:srgbClr val="ffffff"/>
+                      </a:solidFill>
+                    </a:lnR>
+                    <a:lnT w="720">
+                      <a:solidFill>
+                        <a:srgbClr val="ffffff"/>
+                      </a:solidFill>
+                    </a:lnT>
+                    <a:lnB w="720">
+                      <a:solidFill>
+                        <a:srgbClr val="ffffff"/>
+                      </a:solidFill>
+                    </a:lnB>
+                    <a:solidFill>
+                      <a:srgbClr val="cccccc"/>
+                    </a:solidFill>
+                  </a:tcPr>
+                </a:tc>
+                <a:tc>
+                  <a:txBody>
+                    <a:bodyPr lIns="90000" rIns="90000" tIns="46800" bIns="46800" anchor="t">
+                      <a:noAutofit/>
+                    </a:bodyPr>
+                    <a:p>
+                      <a:r>
+                        <a:rPr b="0" lang="en-US" sz="1800" spc="-1" strike="noStrike">
+                          <a:latin typeface="Arial"/>
+                        </a:rPr>
+                        <a:t>2</a:t>
+                      </a:r>
+                      <a:endParaRPr b="0" lang="en-US" sz="1800" spc="-1" strike="noStrike">
+                        <a:latin typeface="Arial"/>
+                      </a:endParaRPr>
+                    </a:p>
+                  </a:txBody>
+                  <a:tcPr anchor="t" marL="90000" marR="90000">
+                    <a:lnL w="720">
+                      <a:solidFill>
+                        <a:srgbClr val="ffffff"/>
+                      </a:solidFill>
+                    </a:lnL>
+                    <a:lnR w="720">
+                      <a:solidFill>
+                        <a:srgbClr val="ffffff"/>
+                      </a:solidFill>
+                    </a:lnR>
+                    <a:lnT w="720">
+                      <a:solidFill>
+                        <a:srgbClr val="ffffff"/>
+                      </a:solidFill>
+                    </a:lnT>
+                    <a:lnB w="720">
+                      <a:solidFill>
+                        <a:srgbClr val="ffffff"/>
+                      </a:solidFill>
+                    </a:lnB>
+                    <a:solidFill>
+                      <a:srgbClr val="cccccc"/>
+                    </a:solidFill>
+                  </a:tcPr>
+                </a:tc>
+              </a:tr>
+              <a:tr h="720360">
+                <a:tc>
+                  <a:txBody>
+                    <a:bodyPr lIns="90000" rIns="90000" tIns="46800" bIns="46800" anchor="t">
+                      <a:noAutofit/>
+                    </a:bodyPr>
+                    <a:p>
+                      <a:r>
+                        <a:rPr b="0" lang="en-US" sz="1800" spc="-1" strike="noStrike">
+                          <a:latin typeface="Arial"/>
+                        </a:rPr>
+                        <a:t>Max_iter</a:t>
+                      </a:r>
+                      <a:endParaRPr b="0" lang="en-US" sz="1800" spc="-1" strike="noStrike">
+                        <a:latin typeface="Arial"/>
+                      </a:endParaRPr>
+                    </a:p>
+                  </a:txBody>
+                  <a:tcPr anchor="t" marL="90000" marR="90000">
+                    <a:lnL w="720">
+                      <a:solidFill>
+                        <a:srgbClr val="ffffff"/>
+                      </a:solidFill>
+                    </a:lnL>
+                    <a:lnR w="720">
+                      <a:solidFill>
+                        <a:srgbClr val="ffffff"/>
+                      </a:solidFill>
+                    </a:lnR>
+                    <a:lnT w="720">
+                      <a:solidFill>
+                        <a:srgbClr val="ffffff"/>
+                      </a:solidFill>
+                    </a:lnT>
+                    <a:lnB w="720">
+                      <a:solidFill>
+                        <a:srgbClr val="ffffff"/>
+                      </a:solidFill>
+                    </a:lnB>
+                    <a:solidFill>
+                      <a:srgbClr val="e6e6e6"/>
+                    </a:solidFill>
+                  </a:tcPr>
+                </a:tc>
+                <a:tc>
+                  <a:txBody>
+                    <a:bodyPr lIns="90000" rIns="90000" tIns="46800" bIns="46800" anchor="t">
+                      <a:noAutofit/>
+                    </a:bodyPr>
+                    <a:p>
+                      <a:r>
+                        <a:rPr b="0" lang="en-US" sz="1800" spc="-1" strike="noStrike">
+                          <a:latin typeface="Arial"/>
+                        </a:rPr>
+                        <a:t>160000</a:t>
+                      </a:r>
+                      <a:endParaRPr b="0" lang="en-US" sz="1800" spc="-1" strike="noStrike">
+                        <a:latin typeface="Arial"/>
+                      </a:endParaRPr>
+                    </a:p>
+                  </a:txBody>
+                  <a:tcPr anchor="t" marL="90000" marR="90000">
+                    <a:lnL w="720">
+                      <a:solidFill>
+                        <a:srgbClr val="ffffff"/>
+                      </a:solidFill>
+                    </a:lnL>
+                    <a:lnR w="720">
+                      <a:solidFill>
+                        <a:srgbClr val="ffffff"/>
+                      </a:solidFill>
+                    </a:lnR>
+                    <a:lnT w="720">
+                      <a:solidFill>
+                        <a:srgbClr val="ffffff"/>
+                      </a:solidFill>
+                    </a:lnT>
+                    <a:lnB w="720">
+                      <a:solidFill>
+                        <a:srgbClr val="ffffff"/>
+                      </a:solidFill>
+                    </a:lnB>
+                    <a:solidFill>
+                      <a:srgbClr val="e6e6e6"/>
+                    </a:solidFill>
+                  </a:tcPr>
+                </a:tc>
+              </a:tr>
+            </a:tbl>
+          </a:graphicData>
+        </a:graphic>
+      </p:graphicFrame>
       <p:sp>
         <p:nvSpPr>
           <p:cNvPr id="3" name="PlaceHolder 2"/>
@@ -5704,7 +6202,7 @@
         <p:txBody>
           <a:bodyPr/>
           <a:p>
-            <a:fld id="{66A32AC8-18AD-4150-9D00-CF67687A54C3}" type="slidenum">
+            <a:fld id="{69C0FDFF-B939-48DB-B157-0911B1A86F8D}" type="slidenum">
               <a:t>5</a:t>
             </a:fld>
           </a:p>
@@ -5724,9 +6222,9 @@
         <p:txBody>
           <a:bodyPr/>
           <a:p>
-            <a:fld id="{4E4C6C74-54BF-41B4-973A-DBC93251E0DD}" type="datetime1">
+            <a:fld id="{B9CABF5E-9370-4E23-927D-DF5BAA2FC65C}" type="datetime1">
               <a:rPr lang="en-US"/>
-              <a:t>01/13/2023</a:t>
+              <a:t>01/20/2023</a:t>
             </a:fld>
           </a:p>
         </p:txBody>
@@ -5763,7 +6261,7 @@
       </p:grpSpPr>
       <p:sp>
         <p:nvSpPr>
-          <p:cNvPr id="94" name="PlaceHolder 1"/>
+          <p:cNvPr id="96" name="PlaceHolder 1"/>
           <p:cNvSpPr>
             <a:spLocks noGrp="1"/>
           </p:cNvSpPr>
@@ -5792,18 +6290,46 @@
             <a:pPr algn="ctr">
               <a:buNone/>
             </a:pPr>
-            <a:r>
-              <a:rPr b="0" lang="en-US" sz="3300" spc="-1" strike="noStrike">
-                <a:solidFill>
-                  <a:srgbClr val="ffffff"/>
-                </a:solidFill>
-                <a:latin typeface="Arial"/>
-              </a:rPr>
-              <a:t>Výsledky fine-tuningu</a:t>
-            </a:r>
             <a:endParaRPr b="0" lang="en-US" sz="3300" spc="-1" strike="noStrike">
               <a:solidFill>
                 <a:srgbClr val="ffffff"/>
+              </a:solidFill>
+              <a:latin typeface="Arial"/>
+            </a:endParaRPr>
+          </a:p>
+        </p:txBody>
+      </p:sp>
+      <p:sp>
+        <p:nvSpPr>
+          <p:cNvPr id="97" name="PlaceHolder 2"/>
+          <p:cNvSpPr>
+            <a:spLocks noGrp="1"/>
+          </p:cNvSpPr>
+          <p:nvPr>
+            <p:ph/>
+          </p:nvPr>
+        </p:nvSpPr>
+        <p:spPr>
+          <a:xfrm>
+            <a:off x="360000" y="1080000"/>
+            <a:ext cx="9360000" cy="3600000"/>
+          </a:xfrm>
+          <a:prstGeom prst="rect">
+            <a:avLst/>
+          </a:prstGeom>
+          <a:noFill/>
+          <a:ln w="0">
+            <a:noFill/>
+          </a:ln>
+        </p:spPr>
+        <p:txBody>
+          <a:bodyPr lIns="0" rIns="0" tIns="0" bIns="0" anchor="t">
+            <a:noAutofit/>
+          </a:bodyPr>
+          <a:p>
+            <a:endParaRPr b="0" lang="en-US" sz="2400" spc="-1" strike="noStrike">
+              <a:solidFill>
+                <a:srgbClr val="009bdd"/>
               </a:solidFill>
               <a:latin typeface="Arial"/>
             </a:endParaRPr>
@@ -5812,7 +6338,7 @@
       </p:sp>
       <p:pic>
         <p:nvPicPr>
-          <p:cNvPr id="95" name="" descr=""/>
+          <p:cNvPr id="98" name="" descr=""/>
           <p:cNvPicPr/>
           <p:nvPr/>
         </p:nvPicPr>
@@ -5822,8 +6348,8 @@
         </p:blipFill>
         <p:spPr>
           <a:xfrm>
-            <a:off x="228600" y="1724040"/>
-            <a:ext cx="9601200" cy="1476360"/>
+            <a:off x="3429000" y="1143000"/>
+            <a:ext cx="6695640" cy="3419280"/>
           </a:xfrm>
           <a:prstGeom prst="rect">
             <a:avLst/>
@@ -5833,9 +6359,32 @@
           </a:ln>
         </p:spPr>
       </p:pic>
-      <p:sp>
-        <p:nvSpPr>
-          <p:cNvPr id="3" name="PlaceHolder 2"/>
+      <p:pic>
+        <p:nvPicPr>
+          <p:cNvPr id="99" name="" descr=""/>
+          <p:cNvPicPr/>
+          <p:nvPr/>
+        </p:nvPicPr>
+        <p:blipFill>
+          <a:blip r:embed="rId2"/>
+          <a:stretch/>
+        </p:blipFill>
+        <p:spPr>
+          <a:xfrm>
+            <a:off x="457200" y="1600200"/>
+            <a:ext cx="3238200" cy="2400120"/>
+          </a:xfrm>
+          <a:prstGeom prst="rect">
+            <a:avLst/>
+          </a:prstGeom>
+          <a:ln w="18000">
+            <a:noFill/>
+          </a:ln>
+        </p:spPr>
+      </p:pic>
+      <p:sp>
+        <p:nvSpPr>
+          <p:cNvPr id="4" name="PlaceHolder 3"/>
           <p:cNvSpPr>
             <a:spLocks noGrp="1"/>
           </p:cNvSpPr>
@@ -5847,7 +6396,7 @@
         <p:txBody>
           <a:bodyPr/>
           <a:p>
-            <a:fld id="{8489CDBE-6968-4C01-A647-D82EF533203C}" type="slidenum">
+            <a:fld id="{823CFE93-593B-4B26-BA41-0177C63704F0}" type="slidenum">
               <a:t>6</a:t>
             </a:fld>
           </a:p>
@@ -5855,7 +6404,7 @@
       </p:sp>
       <p:sp>
         <p:nvSpPr>
-          <p:cNvPr id="4" name="PlaceHolder 3"/>
+          <p:cNvPr id="5" name="PlaceHolder 4"/>
           <p:cNvSpPr>
             <a:spLocks noGrp="1"/>
           </p:cNvSpPr>
@@ -5867,9 +6416,9 @@
         <p:txBody>
           <a:bodyPr/>
           <a:p>
-            <a:fld id="{42DE953B-BCAE-4410-B091-51395F04ECC5}" type="datetime1">
+            <a:fld id="{ACE2A0AE-E010-480B-BB20-2009666A77CC}" type="datetime1">
               <a:rPr lang="en-US"/>
-              <a:t>01/13/2023</a:t>
+              <a:t>01/20/2023</a:t>
             </a:fld>
           </a:p>
         </p:txBody>
@@ -5906,7 +6455,7 @@
       </p:grpSpPr>
       <p:sp>
         <p:nvSpPr>
-          <p:cNvPr id="96" name="PlaceHolder 1"/>
+          <p:cNvPr id="100" name="PlaceHolder 1"/>
           <p:cNvSpPr>
             <a:spLocks noGrp="1"/>
           </p:cNvSpPr>
@@ -5935,18 +6484,94 @@
             <a:pPr algn="ctr">
               <a:buNone/>
             </a:pPr>
+            <a:endParaRPr b="0" lang="en-US" sz="3300" spc="-1" strike="noStrike">
+              <a:solidFill>
+                <a:srgbClr val="ffffff"/>
+              </a:solidFill>
+              <a:latin typeface="Arial"/>
+            </a:endParaRPr>
+          </a:p>
+        </p:txBody>
+      </p:sp>
+      <p:sp>
+        <p:nvSpPr>
+          <p:cNvPr id="101" name="PlaceHolder 2"/>
+          <p:cNvSpPr>
+            <a:spLocks noGrp="1"/>
+          </p:cNvSpPr>
+          <p:nvPr>
+            <p:ph/>
+          </p:nvPr>
+        </p:nvSpPr>
+        <p:spPr>
+          <a:xfrm>
+            <a:off x="360000" y="1080000"/>
+            <a:ext cx="9360000" cy="3600000"/>
+          </a:xfrm>
+          <a:prstGeom prst="rect">
+            <a:avLst/>
+          </a:prstGeom>
+          <a:noFill/>
+          <a:ln w="0">
+            <a:noFill/>
+          </a:ln>
+        </p:spPr>
+        <p:txBody>
+          <a:bodyPr lIns="0" rIns="0" tIns="0" bIns="0" anchor="t">
+            <a:noAutofit/>
+          </a:bodyPr>
+          <a:p>
+            <a:pPr marL="432000" indent="-324000">
+              <a:spcBef>
+                <a:spcPts val="1060"/>
+              </a:spcBef>
+              <a:buClr>
+                <a:srgbClr val="77caee"/>
+              </a:buClr>
+              <a:buSzPct val="45000"/>
+              <a:buFont typeface="Wingdings" charset="2"/>
+              <a:buChar char=""/>
+            </a:pPr>
             <a:r>
-              <a:rPr b="0" lang="en-US" sz="3300" spc="-1" strike="noStrike">
+              <a:rPr b="0" lang="en-US" sz="2400" spc="-1" strike="noStrike">
                 <a:solidFill>
-                  <a:srgbClr val="ffffff"/>
+                  <a:srgbClr val="009bdd"/>
                 </a:solidFill>
                 <a:latin typeface="Arial"/>
               </a:rPr>
-              <a:t>Obrázky použité na 5-shot OD jablka</a:t>
+              <a:t>Precision = TP / TP + FP</a:t>
             </a:r>
-            <a:endParaRPr b="0" lang="en-US" sz="3300" spc="-1" strike="noStrike">
-              <a:solidFill>
-                <a:srgbClr val="ffffff"/>
+            <a:endParaRPr b="0" lang="en-US" sz="2400" spc="-1" strike="noStrike">
+              <a:solidFill>
+                <a:srgbClr val="009bdd"/>
+              </a:solidFill>
+              <a:latin typeface="Arial"/>
+            </a:endParaRPr>
+          </a:p>
+          <a:p>
+            <a:pPr marL="432000" indent="-324000">
+              <a:spcBef>
+                <a:spcPts val="1060"/>
+              </a:spcBef>
+              <a:buClr>
+                <a:srgbClr val="77caee"/>
+              </a:buClr>
+              <a:buSzPct val="45000"/>
+              <a:buFont typeface="Wingdings" charset="2"/>
+              <a:buChar char=""/>
+            </a:pPr>
+            <a:r>
+              <a:rPr b="0" lang="en-US" sz="2400" spc="-1" strike="noStrike">
+                <a:solidFill>
+                  <a:srgbClr val="009bdd"/>
+                </a:solidFill>
+                <a:latin typeface="Arial"/>
+              </a:rPr>
+              <a:t>Recall = TP / TP + FN</a:t>
+            </a:r>
+            <a:endParaRPr b="0" lang="en-US" sz="2400" spc="-1" strike="noStrike">
+              <a:solidFill>
+                <a:srgbClr val="009bdd"/>
               </a:solidFill>
               <a:latin typeface="Arial"/>
             </a:endParaRPr>
@@ -5955,7 +6580,7 @@
       </p:sp>
       <p:pic>
         <p:nvPicPr>
-          <p:cNvPr id="97" name="" descr=""/>
+          <p:cNvPr id="102" name="" descr=""/>
           <p:cNvPicPr/>
           <p:nvPr/>
         </p:nvPicPr>
@@ -5965,8 +6590,8 @@
         </p:blipFill>
         <p:spPr>
           <a:xfrm>
-            <a:off x="457200" y="1600200"/>
-            <a:ext cx="1600200" cy="1600200"/>
+            <a:off x="3238920" y="2286000"/>
+            <a:ext cx="2933280" cy="2467080"/>
           </a:xfrm>
           <a:prstGeom prst="rect">
             <a:avLst/>
@@ -5976,101 +6601,45 @@
           </a:ln>
         </p:spPr>
       </p:pic>
-      <p:pic>
-        <p:nvPicPr>
-          <p:cNvPr id="98" name="" descr=""/>
-          <p:cNvPicPr/>
+      <p:sp>
+        <p:nvSpPr>
+          <p:cNvPr id="103" name=""/>
+          <p:cNvSpPr txBox="1"/>
           <p:nvPr/>
-        </p:nvPicPr>
-        <p:blipFill>
-          <a:blip r:embed="rId2"/>
-          <a:stretch/>
-        </p:blipFill>
-        <p:spPr>
-          <a:xfrm>
-            <a:off x="2400840" y="1600200"/>
-            <a:ext cx="1600200" cy="1600200"/>
-          </a:xfrm>
-          <a:prstGeom prst="rect">
-            <a:avLst/>
-          </a:prstGeom>
+        </p:nvSpPr>
+        <p:spPr>
+          <a:xfrm>
+            <a:off x="4114800" y="3657600"/>
+            <a:ext cx="1143000" cy="346320"/>
+          </a:xfrm>
+          <a:prstGeom prst="rect">
+            <a:avLst/>
+          </a:prstGeom>
+          <a:noFill/>
           <a:ln w="18000">
             <a:noFill/>
           </a:ln>
         </p:spPr>
-      </p:pic>
-      <p:pic>
-        <p:nvPicPr>
-          <p:cNvPr id="99" name="" descr=""/>
-          <p:cNvPicPr/>
-          <p:nvPr/>
-        </p:nvPicPr>
-        <p:blipFill>
-          <a:blip r:embed="rId3"/>
-          <a:stretch/>
-        </p:blipFill>
-        <p:spPr>
-          <a:xfrm>
-            <a:off x="4343400" y="1600200"/>
-            <a:ext cx="1600200" cy="1600200"/>
-          </a:xfrm>
-          <a:prstGeom prst="rect">
-            <a:avLst/>
-          </a:prstGeom>
-          <a:ln w="18000">
-            <a:noFill/>
-          </a:ln>
-        </p:spPr>
-      </p:pic>
-      <p:pic>
-        <p:nvPicPr>
-          <p:cNvPr id="100" name="" descr=""/>
-          <p:cNvPicPr/>
-          <p:nvPr/>
-        </p:nvPicPr>
-        <p:blipFill>
-          <a:blip r:embed="rId4"/>
-          <a:stretch/>
-        </p:blipFill>
-        <p:spPr>
-          <a:xfrm>
-            <a:off x="6172200" y="1600200"/>
-            <a:ext cx="1600200" cy="1600200"/>
-          </a:xfrm>
-          <a:prstGeom prst="rect">
-            <a:avLst/>
-          </a:prstGeom>
-          <a:ln w="18000">
-            <a:noFill/>
-          </a:ln>
-        </p:spPr>
-      </p:pic>
-      <p:pic>
-        <p:nvPicPr>
-          <p:cNvPr id="101" name="" descr=""/>
-          <p:cNvPicPr/>
-          <p:nvPr/>
-        </p:nvPicPr>
-        <p:blipFill>
-          <a:blip r:embed="rId5"/>
-          <a:stretch/>
-        </p:blipFill>
-        <p:spPr>
-          <a:xfrm>
-            <a:off x="8001000" y="1600200"/>
-            <a:ext cx="1600200" cy="1600200"/>
-          </a:xfrm>
-          <a:prstGeom prst="rect">
-            <a:avLst/>
-          </a:prstGeom>
-          <a:ln w="18000">
-            <a:noFill/>
-          </a:ln>
-        </p:spPr>
-      </p:pic>
-      <p:sp>
-        <p:nvSpPr>
-          <p:cNvPr id="3" name="PlaceHolder 2"/>
+        <p:txBody>
+          <a:bodyPr lIns="90000" rIns="90000" tIns="45000" bIns="45000" anchor="t">
+            <a:noAutofit/>
+          </a:bodyPr>
+          <a:p>
+            <a:r>
+              <a:rPr b="0" lang="en-US" sz="1800" spc="-1" strike="noStrike">
+                <a:latin typeface="Arial"/>
+              </a:rPr>
+              <a:t>AP</a:t>
+            </a:r>
+            <a:endParaRPr b="0" lang="en-US" sz="1800" spc="-1" strike="noStrike">
+              <a:latin typeface="Arial"/>
+            </a:endParaRPr>
+          </a:p>
+        </p:txBody>
+      </p:sp>
+      <p:sp>
+        <p:nvSpPr>
+          <p:cNvPr id="4" name="PlaceHolder 3"/>
           <p:cNvSpPr>
             <a:spLocks noGrp="1"/>
           </p:cNvSpPr>
@@ -6082,7 +6651,7 @@
         <p:txBody>
           <a:bodyPr/>
           <a:p>
-            <a:fld id="{8C352013-D39D-4822-A369-C92F8F3DFBFE}" type="slidenum">
+            <a:fld id="{28D7A4CA-24A5-48E7-9D80-7FA69A8834BB}" type="slidenum">
               <a:t>7</a:t>
             </a:fld>
           </a:p>
@@ -6090,7 +6659,7 @@
       </p:sp>
       <p:sp>
         <p:nvSpPr>
-          <p:cNvPr id="4" name="PlaceHolder 3"/>
+          <p:cNvPr id="5" name="PlaceHolder 4"/>
           <p:cNvSpPr>
             <a:spLocks noGrp="1"/>
           </p:cNvSpPr>
@@ -6102,9 +6671,9 @@
         <p:txBody>
           <a:bodyPr/>
           <a:p>
-            <a:fld id="{54B822C4-A257-4FD0-AED8-9ED2FF784F7B}" type="datetime1">
+            <a:fld id="{2CEA733A-CECD-4707-B383-2D0C2EA95B12}" type="datetime1">
               <a:rPr lang="en-US"/>
-              <a:t>01/13/2023</a:t>
+              <a:t>01/20/2023</a:t>
             </a:fld>
           </a:p>
         </p:txBody>
@@ -6141,7 +6710,7 @@
       </p:grpSpPr>
       <p:sp>
         <p:nvSpPr>
-          <p:cNvPr id="102" name="PlaceHolder 1"/>
+          <p:cNvPr id="104" name="PlaceHolder 1"/>
           <p:cNvSpPr>
             <a:spLocks noGrp="1"/>
           </p:cNvSpPr>
@@ -6177,7 +6746,7 @@
                 </a:solidFill>
                 <a:latin typeface="Arial"/>
               </a:rPr>
-              <a:t>Ukážka spustenia natrénovaného modelu</a:t>
+              <a:t>Výsledky fine-tuningu</a:t>
             </a:r>
             <a:endParaRPr b="0" lang="en-US" sz="3300" spc="-1" strike="noStrike">
               <a:solidFill>
@@ -6188,9 +6757,823 @@
           </a:p>
         </p:txBody>
       </p:sp>
+      <p:graphicFrame>
+        <p:nvGraphicFramePr>
+          <p:cNvPr id="105" name=""/>
+          <p:cNvGraphicFramePr/>
+          <p:nvPr/>
+        </p:nvGraphicFramePr>
+        <p:xfrm>
+          <a:off x="5396400" y="1158120"/>
+          <a:ext cx="3742200" cy="3296880"/>
+        </p:xfrm>
+        <a:graphic>
+          <a:graphicData uri="http://schemas.openxmlformats.org/drawingml/2006/table">
+            <a:tbl>
+              <a:tblPr/>
+              <a:tblGrid>
+                <a:gridCol w="1871280"/>
+                <a:gridCol w="1870920"/>
+              </a:tblGrid>
+              <a:tr h="492840">
+                <a:tc>
+                  <a:txBody>
+                    <a:bodyPr lIns="90000" rIns="90000" tIns="46800" bIns="46800" anchor="t">
+                      <a:noAutofit/>
+                    </a:bodyPr>
+                    <a:p>
+                      <a:r>
+                        <a:rPr b="0" lang="en-US" sz="1800" spc="-1" strike="noStrike">
+                          <a:latin typeface="Arial"/>
+                        </a:rPr>
+                        <a:t>AP</a:t>
+                      </a:r>
+                      <a:endParaRPr b="0" lang="en-US" sz="1800" spc="-1" strike="noStrike">
+                        <a:latin typeface="Arial"/>
+                      </a:endParaRPr>
+                    </a:p>
+                  </a:txBody>
+                  <a:tcPr anchor="t" marL="90000" marR="90000">
+                    <a:lnL w="720">
+                      <a:solidFill>
+                        <a:srgbClr val="ffffff"/>
+                      </a:solidFill>
+                    </a:lnL>
+                    <a:lnR w="720">
+                      <a:solidFill>
+                        <a:srgbClr val="ffffff"/>
+                      </a:solidFill>
+                    </a:lnR>
+                    <a:lnT w="720">
+                      <a:solidFill>
+                        <a:srgbClr val="ffffff"/>
+                      </a:solidFill>
+                    </a:lnT>
+                    <a:lnB w="720">
+                      <a:solidFill>
+                        <a:srgbClr val="ffffff"/>
+                      </a:solidFill>
+                    </a:lnB>
+                    <a:solidFill>
+                      <a:srgbClr val="b3b3b3"/>
+                    </a:solidFill>
+                  </a:tcPr>
+                </a:tc>
+                <a:tc>
+                  <a:txBody>
+                    <a:bodyPr lIns="90000" rIns="90000" tIns="46800" bIns="46800" anchor="t">
+                      <a:noAutofit/>
+                    </a:bodyPr>
+                    <a:p>
+                      <a:r>
+                        <a:rPr b="0" lang="en-US" sz="1800" spc="-1" strike="noStrike">
+                          <a:latin typeface="Arial"/>
+                        </a:rPr>
+                        <a:t>44.381</a:t>
+                      </a:r>
+                      <a:endParaRPr b="0" lang="en-US" sz="1800" spc="-1" strike="noStrike">
+                        <a:latin typeface="Arial"/>
+                      </a:endParaRPr>
+                    </a:p>
+                  </a:txBody>
+                  <a:tcPr anchor="t" marL="90000" marR="90000">
+                    <a:lnL w="720">
+                      <a:solidFill>
+                        <a:srgbClr val="ffffff"/>
+                      </a:solidFill>
+                    </a:lnL>
+                    <a:lnR w="720">
+                      <a:solidFill>
+                        <a:srgbClr val="ffffff"/>
+                      </a:solidFill>
+                    </a:lnR>
+                    <a:lnT w="720">
+                      <a:solidFill>
+                        <a:srgbClr val="ffffff"/>
+                      </a:solidFill>
+                    </a:lnT>
+                    <a:lnB w="720">
+                      <a:solidFill>
+                        <a:srgbClr val="ffffff"/>
+                      </a:solidFill>
+                    </a:lnB>
+                    <a:solidFill>
+                      <a:srgbClr val="b3b3b3"/>
+                    </a:solidFill>
+                  </a:tcPr>
+                </a:tc>
+              </a:tr>
+              <a:tr h="492840">
+                <a:tc>
+                  <a:txBody>
+                    <a:bodyPr lIns="90000" rIns="90000" tIns="46800" bIns="46800" anchor="t">
+                      <a:noAutofit/>
+                    </a:bodyPr>
+                    <a:p>
+                      <a:r>
+                        <a:rPr b="0" lang="en-US" sz="1800" spc="-1" strike="noStrike">
+                          <a:latin typeface="Arial"/>
+                        </a:rPr>
+                        <a:t>AP50</a:t>
+                      </a:r>
+                      <a:endParaRPr b="0" lang="en-US" sz="1800" spc="-1" strike="noStrike">
+                        <a:latin typeface="Arial"/>
+                      </a:endParaRPr>
+                    </a:p>
+                  </a:txBody>
+                  <a:tcPr anchor="t" marL="90000" marR="90000">
+                    <a:lnL w="720">
+                      <a:solidFill>
+                        <a:srgbClr val="ffffff"/>
+                      </a:solidFill>
+                    </a:lnL>
+                    <a:lnR w="720">
+                      <a:solidFill>
+                        <a:srgbClr val="ffffff"/>
+                      </a:solidFill>
+                    </a:lnR>
+                    <a:lnT w="720">
+                      <a:solidFill>
+                        <a:srgbClr val="ffffff"/>
+                      </a:solidFill>
+                    </a:lnT>
+                    <a:lnB w="720">
+                      <a:solidFill>
+                        <a:srgbClr val="ffffff"/>
+                      </a:solidFill>
+                    </a:lnB>
+                    <a:solidFill>
+                      <a:srgbClr val="cccccc"/>
+                    </a:solidFill>
+                  </a:tcPr>
+                </a:tc>
+                <a:tc>
+                  <a:txBody>
+                    <a:bodyPr lIns="90000" rIns="90000" tIns="46800" bIns="46800" anchor="t">
+                      <a:noAutofit/>
+                    </a:bodyPr>
+                    <a:p>
+                      <a:r>
+                        <a:rPr b="0" lang="en-US" sz="1800" spc="-1" strike="noStrike">
+                          <a:latin typeface="Arial"/>
+                        </a:rPr>
+                        <a:t>69.290</a:t>
+                      </a:r>
+                      <a:endParaRPr b="0" lang="en-US" sz="1800" spc="-1" strike="noStrike">
+                        <a:latin typeface="Arial"/>
+                      </a:endParaRPr>
+                    </a:p>
+                  </a:txBody>
+                  <a:tcPr anchor="t" marL="90000" marR="90000">
+                    <a:lnL w="720">
+                      <a:solidFill>
+                        <a:srgbClr val="ffffff"/>
+                      </a:solidFill>
+                    </a:lnL>
+                    <a:lnR w="720">
+                      <a:solidFill>
+                        <a:srgbClr val="ffffff"/>
+                      </a:solidFill>
+                    </a:lnR>
+                    <a:lnT w="720">
+                      <a:solidFill>
+                        <a:srgbClr val="ffffff"/>
+                      </a:solidFill>
+                    </a:lnT>
+                    <a:lnB w="720">
+                      <a:solidFill>
+                        <a:srgbClr val="ffffff"/>
+                      </a:solidFill>
+                    </a:lnB>
+                    <a:solidFill>
+                      <a:srgbClr val="cccccc"/>
+                    </a:solidFill>
+                  </a:tcPr>
+                </a:tc>
+              </a:tr>
+              <a:tr h="492840">
+                <a:tc>
+                  <a:txBody>
+                    <a:bodyPr lIns="90000" rIns="90000" tIns="46800" bIns="46800" anchor="t">
+                      <a:noAutofit/>
+                    </a:bodyPr>
+                    <a:p>
+                      <a:r>
+                        <a:rPr b="0" lang="en-US" sz="1800" spc="-1" strike="noStrike">
+                          <a:latin typeface="Arial"/>
+                        </a:rPr>
+                        <a:t>AP75</a:t>
+                      </a:r>
+                      <a:endParaRPr b="0" lang="en-US" sz="1800" spc="-1" strike="noStrike">
+                        <a:latin typeface="Arial"/>
+                      </a:endParaRPr>
+                    </a:p>
+                  </a:txBody>
+                  <a:tcPr anchor="t" marL="90000" marR="90000">
+                    <a:lnL w="720">
+                      <a:solidFill>
+                        <a:srgbClr val="ffffff"/>
+                      </a:solidFill>
+                    </a:lnL>
+                    <a:lnR w="720">
+                      <a:solidFill>
+                        <a:srgbClr val="ffffff"/>
+                      </a:solidFill>
+                    </a:lnR>
+                    <a:lnT w="720">
+                      <a:solidFill>
+                        <a:srgbClr val="ffffff"/>
+                      </a:solidFill>
+                    </a:lnT>
+                    <a:lnB w="720">
+                      <a:solidFill>
+                        <a:srgbClr val="ffffff"/>
+                      </a:solidFill>
+                    </a:lnB>
+                    <a:solidFill>
+                      <a:srgbClr val="e6e6e6"/>
+                    </a:solidFill>
+                  </a:tcPr>
+                </a:tc>
+                <a:tc>
+                  <a:txBody>
+                    <a:bodyPr lIns="90000" rIns="90000" tIns="46800" bIns="46800" anchor="t">
+                      <a:noAutofit/>
+                    </a:bodyPr>
+                    <a:p>
+                      <a:r>
+                        <a:rPr b="0" lang="en-US" sz="1800" spc="-1" strike="noStrike">
+                          <a:latin typeface="Arial"/>
+                        </a:rPr>
+                        <a:t>49.104</a:t>
+                      </a:r>
+                      <a:endParaRPr b="0" lang="en-US" sz="1800" spc="-1" strike="noStrike">
+                        <a:latin typeface="Arial"/>
+                      </a:endParaRPr>
+                    </a:p>
+                  </a:txBody>
+                  <a:tcPr anchor="t" marL="90000" marR="90000">
+                    <a:lnL w="720">
+                      <a:solidFill>
+                        <a:srgbClr val="ffffff"/>
+                      </a:solidFill>
+                    </a:lnL>
+                    <a:lnR w="720">
+                      <a:solidFill>
+                        <a:srgbClr val="ffffff"/>
+                      </a:solidFill>
+                    </a:lnR>
+                    <a:lnT w="720">
+                      <a:solidFill>
+                        <a:srgbClr val="ffffff"/>
+                      </a:solidFill>
+                    </a:lnT>
+                    <a:lnB w="720">
+                      <a:solidFill>
+                        <a:srgbClr val="ffffff"/>
+                      </a:solidFill>
+                    </a:lnB>
+                    <a:solidFill>
+                      <a:srgbClr val="e6e6e6"/>
+                    </a:solidFill>
+                  </a:tcPr>
+                </a:tc>
+              </a:tr>
+              <a:tr h="492840">
+                <a:tc>
+                  <a:txBody>
+                    <a:bodyPr lIns="90000" rIns="90000" tIns="46800" bIns="46800" anchor="t">
+                      <a:noAutofit/>
+                    </a:bodyPr>
+                    <a:p>
+                      <a:r>
+                        <a:rPr b="0" lang="en-US" sz="1800" spc="-1" strike="noStrike">
+                          <a:latin typeface="Arial"/>
+                        </a:rPr>
+                        <a:t>bAP</a:t>
+                      </a:r>
+                      <a:endParaRPr b="0" lang="en-US" sz="1800" spc="-1" strike="noStrike">
+                        <a:latin typeface="Arial"/>
+                      </a:endParaRPr>
+                    </a:p>
+                  </a:txBody>
+                  <a:tcPr anchor="t" marL="90000" marR="90000">
+                    <a:lnL w="720">
+                      <a:solidFill>
+                        <a:srgbClr val="ffffff"/>
+                      </a:solidFill>
+                    </a:lnL>
+                    <a:lnR w="720">
+                      <a:solidFill>
+                        <a:srgbClr val="ffffff"/>
+                      </a:solidFill>
+                    </a:lnR>
+                    <a:lnT w="720">
+                      <a:solidFill>
+                        <a:srgbClr val="ffffff"/>
+                      </a:solidFill>
+                    </a:lnT>
+                    <a:lnB w="720">
+                      <a:solidFill>
+                        <a:srgbClr val="ffffff"/>
+                      </a:solidFill>
+                    </a:lnB>
+                    <a:solidFill>
+                      <a:srgbClr val="cccccc"/>
+                    </a:solidFill>
+                  </a:tcPr>
+                </a:tc>
+                <a:tc>
+                  <a:txBody>
+                    <a:bodyPr lIns="90000" rIns="90000" tIns="46800" bIns="46800" anchor="t">
+                      <a:noAutofit/>
+                    </a:bodyPr>
+                    <a:p>
+                      <a:r>
+                        <a:rPr b="0" lang="en-US" sz="1800" spc="-1" strike="noStrike">
+                          <a:latin typeface="Arial"/>
+                        </a:rPr>
+                        <a:t>49.950</a:t>
+                      </a:r>
+                      <a:endParaRPr b="0" lang="en-US" sz="1800" spc="-1" strike="noStrike">
+                        <a:latin typeface="Arial"/>
+                      </a:endParaRPr>
+                    </a:p>
+                  </a:txBody>
+                  <a:tcPr anchor="t" marL="90000" marR="90000">
+                    <a:lnL w="720">
+                      <a:solidFill>
+                        <a:srgbClr val="ffffff"/>
+                      </a:solidFill>
+                    </a:lnL>
+                    <a:lnR w="720">
+                      <a:solidFill>
+                        <a:srgbClr val="ffffff"/>
+                      </a:solidFill>
+                    </a:lnR>
+                    <a:lnT w="720">
+                      <a:solidFill>
+                        <a:srgbClr val="ffffff"/>
+                      </a:solidFill>
+                    </a:lnT>
+                    <a:lnB w="720">
+                      <a:solidFill>
+                        <a:srgbClr val="ffffff"/>
+                      </a:solidFill>
+                    </a:lnB>
+                    <a:solidFill>
+                      <a:srgbClr val="cccccc"/>
+                    </a:solidFill>
+                  </a:tcPr>
+                </a:tc>
+              </a:tr>
+              <a:tr h="492840">
+                <a:tc>
+                  <a:txBody>
+                    <a:bodyPr lIns="90000" rIns="90000" tIns="46800" bIns="46800" anchor="t">
+                      <a:noAutofit/>
+                    </a:bodyPr>
+                    <a:p>
+                      <a:r>
+                        <a:rPr b="0" lang="en-US" sz="1800" spc="-1" strike="noStrike">
+                          <a:latin typeface="Arial"/>
+                        </a:rPr>
+                        <a:t>bAP50</a:t>
+                      </a:r>
+                      <a:endParaRPr b="0" lang="en-US" sz="1800" spc="-1" strike="noStrike">
+                        <a:latin typeface="Arial"/>
+                      </a:endParaRPr>
+                    </a:p>
+                  </a:txBody>
+                  <a:tcPr anchor="t" marL="90000" marR="90000">
+                    <a:lnL w="720">
+                      <a:solidFill>
+                        <a:srgbClr val="ffffff"/>
+                      </a:solidFill>
+                    </a:lnL>
+                    <a:lnR w="720">
+                      <a:solidFill>
+                        <a:srgbClr val="ffffff"/>
+                      </a:solidFill>
+                    </a:lnR>
+                    <a:lnT w="720">
+                      <a:solidFill>
+                        <a:srgbClr val="ffffff"/>
+                      </a:solidFill>
+                    </a:lnT>
+                    <a:lnB w="720">
+                      <a:solidFill>
+                        <a:srgbClr val="ffffff"/>
+                      </a:solidFill>
+                    </a:lnB>
+                    <a:solidFill>
+                      <a:srgbClr val="e6e6e6"/>
+                    </a:solidFill>
+                  </a:tcPr>
+                </a:tc>
+                <a:tc>
+                  <a:txBody>
+                    <a:bodyPr lIns="90000" rIns="90000" tIns="46800" bIns="46800" anchor="t">
+                      <a:noAutofit/>
+                    </a:bodyPr>
+                    <a:p>
+                      <a:r>
+                        <a:rPr b="0" lang="en-US" sz="1800" spc="-1" strike="noStrike">
+                          <a:latin typeface="Arial"/>
+                        </a:rPr>
+                        <a:t>77.605</a:t>
+                      </a:r>
+                      <a:endParaRPr b="0" lang="en-US" sz="1800" spc="-1" strike="noStrike">
+                        <a:latin typeface="Arial"/>
+                      </a:endParaRPr>
+                    </a:p>
+                  </a:txBody>
+                  <a:tcPr anchor="t" marL="90000" marR="90000">
+                    <a:lnL w="720">
+                      <a:solidFill>
+                        <a:srgbClr val="ffffff"/>
+                      </a:solidFill>
+                    </a:lnL>
+                    <a:lnR w="720">
+                      <a:solidFill>
+                        <a:srgbClr val="ffffff"/>
+                      </a:solidFill>
+                    </a:lnR>
+                    <a:lnT w="720">
+                      <a:solidFill>
+                        <a:srgbClr val="ffffff"/>
+                      </a:solidFill>
+                    </a:lnT>
+                    <a:lnB w="720">
+                      <a:solidFill>
+                        <a:srgbClr val="ffffff"/>
+                      </a:solidFill>
+                    </a:lnB>
+                    <a:solidFill>
+                      <a:srgbClr val="e6e6e6"/>
+                    </a:solidFill>
+                  </a:tcPr>
+                </a:tc>
+              </a:tr>
+              <a:tr h="492840">
+                <a:tc>
+                  <a:txBody>
+                    <a:bodyPr lIns="90000" rIns="90000" tIns="46800" bIns="46800" anchor="t">
+                      <a:noAutofit/>
+                    </a:bodyPr>
+                    <a:p>
+                      <a:r>
+                        <a:rPr b="0" lang="en-US" sz="1800" spc="-1" strike="noStrike">
+                          <a:latin typeface="Arial"/>
+                        </a:rPr>
+                        <a:t>bAP75</a:t>
+                      </a:r>
+                      <a:endParaRPr b="0" lang="en-US" sz="1800" spc="-1" strike="noStrike">
+                        <a:latin typeface="Arial"/>
+                      </a:endParaRPr>
+                    </a:p>
+                  </a:txBody>
+                  <a:tcPr anchor="t" marL="90000" marR="90000">
+                    <a:lnL w="720">
+                      <a:solidFill>
+                        <a:srgbClr val="ffffff"/>
+                      </a:solidFill>
+                    </a:lnL>
+                    <a:lnR w="720">
+                      <a:solidFill>
+                        <a:srgbClr val="ffffff"/>
+                      </a:solidFill>
+                    </a:lnR>
+                    <a:lnT w="720">
+                      <a:solidFill>
+                        <a:srgbClr val="ffffff"/>
+                      </a:solidFill>
+                    </a:lnT>
+                    <a:lnB w="720">
+                      <a:solidFill>
+                        <a:srgbClr val="ffffff"/>
+                      </a:solidFill>
+                    </a:lnB>
+                    <a:solidFill>
+                      <a:srgbClr val="cccccc"/>
+                    </a:solidFill>
+                  </a:tcPr>
+                </a:tc>
+                <a:tc>
+                  <a:txBody>
+                    <a:bodyPr lIns="90000" rIns="90000" tIns="46800" bIns="46800" anchor="t">
+                      <a:noAutofit/>
+                    </a:bodyPr>
+                    <a:p>
+                      <a:r>
+                        <a:rPr b="0" lang="en-US" sz="1800" spc="-1" strike="noStrike">
+                          <a:latin typeface="Arial"/>
+                        </a:rPr>
+                        <a:t>55.450</a:t>
+                      </a:r>
+                      <a:endParaRPr b="0" lang="en-US" sz="1800" spc="-1" strike="noStrike">
+                        <a:latin typeface="Arial"/>
+                      </a:endParaRPr>
+                    </a:p>
+                  </a:txBody>
+                  <a:tcPr anchor="t" marL="90000" marR="90000">
+                    <a:lnL w="720">
+                      <a:solidFill>
+                        <a:srgbClr val="ffffff"/>
+                      </a:solidFill>
+                    </a:lnL>
+                    <a:lnR w="720">
+                      <a:solidFill>
+                        <a:srgbClr val="ffffff"/>
+                      </a:solidFill>
+                    </a:lnR>
+                    <a:lnT w="720">
+                      <a:solidFill>
+                        <a:srgbClr val="ffffff"/>
+                      </a:solidFill>
+                    </a:lnT>
+                    <a:lnB w="720">
+                      <a:solidFill>
+                        <a:srgbClr val="ffffff"/>
+                      </a:solidFill>
+                    </a:lnB>
+                    <a:solidFill>
+                      <a:srgbClr val="cccccc"/>
+                    </a:solidFill>
+                  </a:tcPr>
+                </a:tc>
+              </a:tr>
+              <a:tr h="492840">
+                <a:tc>
+                  <a:txBody>
+                    <a:bodyPr lIns="90000" rIns="90000" tIns="46800" bIns="46800" anchor="t">
+                      <a:noAutofit/>
+                    </a:bodyPr>
+                    <a:p>
+                      <a:r>
+                        <a:rPr b="0" lang="en-US" sz="1800" spc="-1" strike="noStrike">
+                          <a:latin typeface="Arial"/>
+                        </a:rPr>
+                        <a:t>nAP</a:t>
+                      </a:r>
+                      <a:endParaRPr b="0" lang="en-US" sz="1800" spc="-1" strike="noStrike">
+                        <a:latin typeface="Arial"/>
+                      </a:endParaRPr>
+                    </a:p>
+                  </a:txBody>
+                  <a:tcPr anchor="t" marL="90000" marR="90000">
+                    <a:lnL w="720">
+                      <a:solidFill>
+                        <a:srgbClr val="ffffff"/>
+                      </a:solidFill>
+                    </a:lnL>
+                    <a:lnR w="720">
+                      <a:solidFill>
+                        <a:srgbClr val="ffffff"/>
+                      </a:solidFill>
+                    </a:lnR>
+                    <a:lnT w="720">
+                      <a:solidFill>
+                        <a:srgbClr val="ffffff"/>
+                      </a:solidFill>
+                    </a:lnT>
+                    <a:lnB w="720">
+                      <a:solidFill>
+                        <a:srgbClr val="ffffff"/>
+                      </a:solidFill>
+                    </a:lnB>
+                    <a:solidFill>
+                      <a:srgbClr val="e6e6e6"/>
+                    </a:solidFill>
+                  </a:tcPr>
+                </a:tc>
+                <a:tc>
+                  <a:txBody>
+                    <a:bodyPr lIns="90000" rIns="90000" tIns="46800" bIns="46800" anchor="t">
+                      <a:noAutofit/>
+                    </a:bodyPr>
+                    <a:p>
+                      <a:r>
+                        <a:rPr b="0" lang="en-US" sz="1800" spc="-1" strike="noStrike">
+                          <a:latin typeface="Arial"/>
+                        </a:rPr>
+                        <a:t>30.459</a:t>
+                      </a:r>
+                      <a:endParaRPr b="0" lang="en-US" sz="1800" spc="-1" strike="noStrike">
+                        <a:latin typeface="Arial"/>
+                      </a:endParaRPr>
+                    </a:p>
+                  </a:txBody>
+                  <a:tcPr anchor="t" marL="90000" marR="90000">
+                    <a:lnL w="720">
+                      <a:solidFill>
+                        <a:srgbClr val="ffffff"/>
+                      </a:solidFill>
+                    </a:lnL>
+                    <a:lnR w="720">
+                      <a:solidFill>
+                        <a:srgbClr val="ffffff"/>
+                      </a:solidFill>
+                    </a:lnR>
+                    <a:lnT w="720">
+                      <a:solidFill>
+                        <a:srgbClr val="ffffff"/>
+                      </a:solidFill>
+                    </a:lnT>
+                    <a:lnB w="720">
+                      <a:solidFill>
+                        <a:srgbClr val="ffffff"/>
+                      </a:solidFill>
+                    </a:lnB>
+                    <a:solidFill>
+                      <a:srgbClr val="e6e6e6"/>
+                    </a:solidFill>
+                  </a:tcPr>
+                </a:tc>
+              </a:tr>
+              <a:tr h="492840">
+                <a:tc>
+                  <a:txBody>
+                    <a:bodyPr lIns="90000" rIns="90000" tIns="46800" bIns="46800" anchor="t">
+                      <a:noAutofit/>
+                    </a:bodyPr>
+                    <a:p>
+                      <a:r>
+                        <a:rPr b="0" lang="en-US" sz="1800" spc="-1" strike="noStrike">
+                          <a:latin typeface="Arial"/>
+                        </a:rPr>
+                        <a:t>nAP50</a:t>
+                      </a:r>
+                      <a:endParaRPr b="0" lang="en-US" sz="1800" spc="-1" strike="noStrike">
+                        <a:latin typeface="Arial"/>
+                      </a:endParaRPr>
+                    </a:p>
+                  </a:txBody>
+                  <a:tcPr anchor="t" marL="90000" marR="90000">
+                    <a:lnL w="720">
+                      <a:solidFill>
+                        <a:srgbClr val="ffffff"/>
+                      </a:solidFill>
+                    </a:lnL>
+                    <a:lnR w="720">
+                      <a:solidFill>
+                        <a:srgbClr val="ffffff"/>
+                      </a:solidFill>
+                    </a:lnR>
+                    <a:lnT w="720">
+                      <a:solidFill>
+                        <a:srgbClr val="ffffff"/>
+                      </a:solidFill>
+                    </a:lnT>
+                    <a:lnB w="720">
+                      <a:solidFill>
+                        <a:srgbClr val="ffffff"/>
+                      </a:solidFill>
+                    </a:lnB>
+                    <a:solidFill>
+                      <a:srgbClr val="cccccc"/>
+                    </a:solidFill>
+                  </a:tcPr>
+                </a:tc>
+                <a:tc>
+                  <a:txBody>
+                    <a:bodyPr lIns="90000" rIns="90000" tIns="46800" bIns="46800" anchor="t">
+                      <a:noAutofit/>
+                    </a:bodyPr>
+                    <a:p>
+                      <a:r>
+                        <a:rPr b="0" lang="en-US" sz="1800" spc="-1" strike="noStrike">
+                          <a:latin typeface="Arial"/>
+                        </a:rPr>
+                        <a:t>48.502</a:t>
+                      </a:r>
+                      <a:endParaRPr b="0" lang="en-US" sz="1800" spc="-1" strike="noStrike">
+                        <a:latin typeface="Arial"/>
+                      </a:endParaRPr>
+                    </a:p>
+                  </a:txBody>
+                  <a:tcPr anchor="t" marL="90000" marR="90000">
+                    <a:lnL w="720">
+                      <a:solidFill>
+                        <a:srgbClr val="ffffff"/>
+                      </a:solidFill>
+                    </a:lnL>
+                    <a:lnR w="720">
+                      <a:solidFill>
+                        <a:srgbClr val="ffffff"/>
+                      </a:solidFill>
+                    </a:lnR>
+                    <a:lnT w="720">
+                      <a:solidFill>
+                        <a:srgbClr val="ffffff"/>
+                      </a:solidFill>
+                    </a:lnT>
+                    <a:lnB w="720">
+                      <a:solidFill>
+                        <a:srgbClr val="ffffff"/>
+                      </a:solidFill>
+                    </a:lnB>
+                    <a:solidFill>
+                      <a:srgbClr val="cccccc"/>
+                    </a:solidFill>
+                  </a:tcPr>
+                </a:tc>
+              </a:tr>
+              <a:tr h="497520">
+                <a:tc>
+                  <a:txBody>
+                    <a:bodyPr lIns="90000" rIns="90000" tIns="46800" bIns="46800" anchor="t">
+                      <a:noAutofit/>
+                    </a:bodyPr>
+                    <a:p>
+                      <a:r>
+                        <a:rPr b="0" lang="en-US" sz="1800" spc="-1" strike="noStrike">
+                          <a:latin typeface="Arial"/>
+                        </a:rPr>
+                        <a:t>nAP75</a:t>
+                      </a:r>
+                      <a:endParaRPr b="0" lang="en-US" sz="1800" spc="-1" strike="noStrike">
+                        <a:latin typeface="Arial"/>
+                      </a:endParaRPr>
+                    </a:p>
+                  </a:txBody>
+                  <a:tcPr anchor="t" marL="90000" marR="90000">
+                    <a:lnL w="720">
+                      <a:solidFill>
+                        <a:srgbClr val="ffffff"/>
+                      </a:solidFill>
+                    </a:lnL>
+                    <a:lnR w="720">
+                      <a:solidFill>
+                        <a:srgbClr val="ffffff"/>
+                      </a:solidFill>
+                    </a:lnR>
+                    <a:lnT w="720">
+                      <a:solidFill>
+                        <a:srgbClr val="ffffff"/>
+                      </a:solidFill>
+                    </a:lnT>
+                    <a:lnB w="720">
+                      <a:solidFill>
+                        <a:srgbClr val="ffffff"/>
+                      </a:solidFill>
+                    </a:lnB>
+                    <a:solidFill>
+                      <a:srgbClr val="e6e6e6"/>
+                    </a:solidFill>
+                  </a:tcPr>
+                </a:tc>
+                <a:tc>
+                  <a:txBody>
+                    <a:bodyPr lIns="90000" rIns="90000" tIns="46800" bIns="46800" anchor="t">
+                      <a:noAutofit/>
+                    </a:bodyPr>
+                    <a:p>
+                      <a:r>
+                        <a:rPr b="0" lang="en-US" sz="1800" spc="-1" strike="noStrike">
+                          <a:latin typeface="Arial"/>
+                        </a:rPr>
+                        <a:t>33.239</a:t>
+                      </a:r>
+                      <a:endParaRPr b="0" lang="en-US" sz="1800" spc="-1" strike="noStrike">
+                        <a:latin typeface="Arial"/>
+                      </a:endParaRPr>
+                    </a:p>
+                  </a:txBody>
+                  <a:tcPr anchor="t" marL="90000" marR="90000">
+                    <a:lnL w="720">
+                      <a:solidFill>
+                        <a:srgbClr val="ffffff"/>
+                      </a:solidFill>
+                    </a:lnL>
+                    <a:lnR w="720">
+                      <a:solidFill>
+                        <a:srgbClr val="ffffff"/>
+                      </a:solidFill>
+                    </a:lnR>
+                    <a:lnT w="720">
+                      <a:solidFill>
+                        <a:srgbClr val="ffffff"/>
+                      </a:solidFill>
+                    </a:lnT>
+                    <a:lnB w="720">
+                      <a:solidFill>
+                        <a:srgbClr val="ffffff"/>
+                      </a:solidFill>
+                    </a:lnB>
+                    <a:solidFill>
+                      <a:srgbClr val="e6e6e6"/>
+                    </a:solidFill>
+                  </a:tcPr>
+                </a:tc>
+              </a:tr>
+            </a:tbl>
+          </a:graphicData>
+        </a:graphic>
+      </p:graphicFrame>
       <p:pic>
         <p:nvPicPr>
-          <p:cNvPr id="103" name="" descr=""/>
+          <p:cNvPr id="106" name="" descr=""/>
           <p:cNvPicPr/>
           <p:nvPr/>
         </p:nvPicPr>
@@ -6200,8 +7583,8 @@
         </p:blipFill>
         <p:spPr>
           <a:xfrm>
-            <a:off x="2633400" y="1080000"/>
-            <a:ext cx="4813200" cy="3600000"/>
+            <a:off x="1730160" y="914400"/>
+            <a:ext cx="3299040" cy="4662000"/>
           </a:xfrm>
           <a:prstGeom prst="rect">
             <a:avLst/>
@@ -6213,6 +7596,42 @@
       </p:pic>
       <p:sp>
         <p:nvSpPr>
+          <p:cNvPr id="107" name=""/>
+          <p:cNvSpPr txBox="1"/>
+          <p:nvPr/>
+        </p:nvSpPr>
+        <p:spPr>
+          <a:xfrm>
+            <a:off x="5257800" y="796680"/>
+            <a:ext cx="4572000" cy="346320"/>
+          </a:xfrm>
+          <a:prstGeom prst="rect">
+            <a:avLst/>
+          </a:prstGeom>
+          <a:noFill/>
+          <a:ln w="18000">
+            <a:noFill/>
+          </a:ln>
+        </p:spPr>
+        <p:txBody>
+          <a:bodyPr lIns="90000" rIns="90000" tIns="45000" bIns="45000" anchor="t">
+            <a:noAutofit/>
+          </a:bodyPr>
+          <a:p>
+            <a:r>
+              <a:rPr b="0" lang="en-US" sz="1800" spc="-1" strike="noStrike">
+                <a:latin typeface="Arial"/>
+              </a:rPr>
+              <a:t>Priemerné hodnoty pre všetky triedy:</a:t>
+            </a:r>
+            <a:endParaRPr b="0" lang="en-US" sz="1800" spc="-1" strike="noStrike">
+              <a:latin typeface="Arial"/>
+            </a:endParaRPr>
+          </a:p>
+        </p:txBody>
+      </p:sp>
+      <p:sp>
+        <p:nvSpPr>
           <p:cNvPr id="3" name="PlaceHolder 2"/>
           <p:cNvSpPr>
             <a:spLocks noGrp="1"/>
@@ -6225,7 +7644,7 @@
         <p:txBody>
           <a:bodyPr/>
           <a:p>
-            <a:fld id="{EC998B49-1B19-4C4D-A53D-126256F43719}" type="slidenum">
+            <a:fld id="{AEAE50CB-C017-4220-AA5D-13348132B6F2}" type="slidenum">
               <a:t>8</a:t>
             </a:fld>
           </a:p>
@@ -6245,9 +7664,244 @@
         <p:txBody>
           <a:bodyPr/>
           <a:p>
-            <a:fld id="{430E3050-48EB-45E8-8242-D2BA2A966EF7}" type="datetime1">
+            <a:fld id="{712D45A9-6CAD-49B0-B13C-BA81071370B3}" type="datetime1">
               <a:rPr lang="en-US"/>
-              <a:t>01/13/2023</a:t>
+              <a:t>01/20/2023</a:t>
+            </a:fld>
+          </a:p>
+        </p:txBody>
+      </p:sp>
+    </p:spTree>
+  </p:cSld>
+  <mc:AlternateContent>
+    <mc:Choice Requires="p14">
+      <p:transition spd="slow" p14:dur="2000"/>
+    </mc:Choice>
+    <mc:Fallback>
+      <p:transition spd="slow"/>
+    </mc:Fallback>
+  </mc:AlternateContent>
+</p:sld>
+</file>
+
+<file path=ppt/slides/slide9.xml><?xml version="1.0" encoding="utf-8"?>
+<p:sld xmlns:a="http://schemas.openxmlformats.org/drawingml/2006/main" xmlns:p="http://schemas.openxmlformats.org/presentationml/2006/main" xmlns:r="http://schemas.openxmlformats.org/officeDocument/2006/relationships" xmlns:p14="http://schemas.microsoft.com/office/powerpoint/2010/main" xmlns:p15="http://schemas.microsoft.com/office/powerpoint/2012/main" xmlns:mc="http://schemas.openxmlformats.org/markup-compatibility/2006">
+  <p:cSld>
+    <p:spTree>
+      <p:nvGrpSpPr>
+        <p:cNvPr id="1" name=""/>
+        <p:cNvGrpSpPr/>
+        <p:nvPr/>
+      </p:nvGrpSpPr>
+      <p:grpSpPr>
+        <a:xfrm>
+          <a:off x="0" y="0"/>
+          <a:ext cx="0" cy="0"/>
+          <a:chOff x="0" y="0"/>
+          <a:chExt cx="0" cy="0"/>
+        </a:xfrm>
+      </p:grpSpPr>
+      <p:sp>
+        <p:nvSpPr>
+          <p:cNvPr id="108" name="PlaceHolder 1"/>
+          <p:cNvSpPr>
+            <a:spLocks noGrp="1"/>
+          </p:cNvSpPr>
+          <p:nvPr>
+            <p:ph type="title"/>
+          </p:nvPr>
+        </p:nvSpPr>
+        <p:spPr>
+          <a:xfrm>
+            <a:off x="360000" y="180000"/>
+            <a:ext cx="9360000" cy="478080"/>
+          </a:xfrm>
+          <a:prstGeom prst="rect">
+            <a:avLst/>
+          </a:prstGeom>
+          <a:noFill/>
+          <a:ln w="0">
+            <a:noFill/>
+          </a:ln>
+        </p:spPr>
+        <p:txBody>
+          <a:bodyPr lIns="0" rIns="0" tIns="0" bIns="0" anchor="ctr">
+            <a:noAutofit/>
+          </a:bodyPr>
+          <a:p>
+            <a:pPr algn="ctr">
+              <a:buNone/>
+            </a:pPr>
+            <a:r>
+              <a:rPr b="0" lang="en-US" sz="3300" spc="-1" strike="noStrike">
+                <a:solidFill>
+                  <a:srgbClr val="ffffff"/>
+                </a:solidFill>
+                <a:latin typeface="Arial"/>
+              </a:rPr>
+              <a:t>Obrázky použité na 5-shot OD jablka</a:t>
+            </a:r>
+            <a:endParaRPr b="0" lang="en-US" sz="3300" spc="-1" strike="noStrike">
+              <a:solidFill>
+                <a:srgbClr val="ffffff"/>
+              </a:solidFill>
+              <a:latin typeface="Arial"/>
+            </a:endParaRPr>
+          </a:p>
+        </p:txBody>
+      </p:sp>
+      <p:pic>
+        <p:nvPicPr>
+          <p:cNvPr id="109" name="" descr=""/>
+          <p:cNvPicPr/>
+          <p:nvPr/>
+        </p:nvPicPr>
+        <p:blipFill>
+          <a:blip r:embed="rId1"/>
+          <a:stretch/>
+        </p:blipFill>
+        <p:spPr>
+          <a:xfrm>
+            <a:off x="457200" y="1600200"/>
+            <a:ext cx="1600200" cy="1600200"/>
+          </a:xfrm>
+          <a:prstGeom prst="rect">
+            <a:avLst/>
+          </a:prstGeom>
+          <a:ln w="18000">
+            <a:noFill/>
+          </a:ln>
+        </p:spPr>
+      </p:pic>
+      <p:pic>
+        <p:nvPicPr>
+          <p:cNvPr id="110" name="" descr=""/>
+          <p:cNvPicPr/>
+          <p:nvPr/>
+        </p:nvPicPr>
+        <p:blipFill>
+          <a:blip r:embed="rId2"/>
+          <a:stretch/>
+        </p:blipFill>
+        <p:spPr>
+          <a:xfrm>
+            <a:off x="2400840" y="1600200"/>
+            <a:ext cx="1600200" cy="1600200"/>
+          </a:xfrm>
+          <a:prstGeom prst="rect">
+            <a:avLst/>
+          </a:prstGeom>
+          <a:ln w="18000">
+            <a:noFill/>
+          </a:ln>
+        </p:spPr>
+      </p:pic>
+      <p:pic>
+        <p:nvPicPr>
+          <p:cNvPr id="111" name="" descr=""/>
+          <p:cNvPicPr/>
+          <p:nvPr/>
+        </p:nvPicPr>
+        <p:blipFill>
+          <a:blip r:embed="rId3"/>
+          <a:stretch/>
+        </p:blipFill>
+        <p:spPr>
+          <a:xfrm>
+            <a:off x="4343400" y="1600200"/>
+            <a:ext cx="1600200" cy="1600200"/>
+          </a:xfrm>
+          <a:prstGeom prst="rect">
+            <a:avLst/>
+          </a:prstGeom>
+          <a:ln w="18000">
+            <a:noFill/>
+          </a:ln>
+        </p:spPr>
+      </p:pic>
+      <p:pic>
+        <p:nvPicPr>
+          <p:cNvPr id="112" name="" descr=""/>
+          <p:cNvPicPr/>
+          <p:nvPr/>
+        </p:nvPicPr>
+        <p:blipFill>
+          <a:blip r:embed="rId4"/>
+          <a:stretch/>
+        </p:blipFill>
+        <p:spPr>
+          <a:xfrm>
+            <a:off x="6172200" y="1600200"/>
+            <a:ext cx="1600200" cy="1600200"/>
+          </a:xfrm>
+          <a:prstGeom prst="rect">
+            <a:avLst/>
+          </a:prstGeom>
+          <a:ln w="18000">
+            <a:noFill/>
+          </a:ln>
+        </p:spPr>
+      </p:pic>
+      <p:pic>
+        <p:nvPicPr>
+          <p:cNvPr id="113" name="" descr=""/>
+          <p:cNvPicPr/>
+          <p:nvPr/>
+        </p:nvPicPr>
+        <p:blipFill>
+          <a:blip r:embed="rId5"/>
+          <a:stretch/>
+        </p:blipFill>
+        <p:spPr>
+          <a:xfrm>
+            <a:off x="8001000" y="1600200"/>
+            <a:ext cx="1600200" cy="1600200"/>
+          </a:xfrm>
+          <a:prstGeom prst="rect">
+            <a:avLst/>
+          </a:prstGeom>
+          <a:ln w="18000">
+            <a:noFill/>
+          </a:ln>
+        </p:spPr>
+      </p:pic>
+      <p:sp>
+        <p:nvSpPr>
+          <p:cNvPr id="3" name="PlaceHolder 2"/>
+          <p:cNvSpPr>
+            <a:spLocks noGrp="1"/>
+          </p:cNvSpPr>
+          <p:nvPr>
+            <p:ph type="sldNum" idx="3"/>
+          </p:nvPr>
+        </p:nvSpPr>
+        <p:spPr/>
+        <p:txBody>
+          <a:bodyPr/>
+          <a:p>
+            <a:fld id="{8A9EEEDD-3478-4506-A08F-F9AC63E5E644}" type="slidenum">
+              <a:t>9</a:t>
+            </a:fld>
+          </a:p>
+        </p:txBody>
+      </p:sp>
+      <p:sp>
+        <p:nvSpPr>
+          <p:cNvPr id="4" name="PlaceHolder 3"/>
+          <p:cNvSpPr>
+            <a:spLocks noGrp="1"/>
+          </p:cNvSpPr>
+          <p:nvPr>
+            <p:ph type="dt" idx="1"/>
+          </p:nvPr>
+        </p:nvSpPr>
+        <p:spPr/>
+        <p:txBody>
+          <a:bodyPr/>
+          <a:p>
+            <a:fld id="{4D0B1DDA-C91F-4B24-8E44-3BCB49B5AA94}" type="datetime1">
+              <a:rPr lang="en-US"/>
+              <a:t>01/20/2023</a:t>
             </a:fld>
           </a:p>
         </p:txBody>

</xml_diff>